<commit_message>
Fixed italicised links in citations
</commit_message>
<xml_diff>
--- a/People/Brandon-Bosman/Julia Poster/Poster.pptx
+++ b/People/Brandon-Bosman/Julia Poster/Poster.pptx
@@ -7876,10 +7876,18 @@
                     <a:schemeClr val="tx1"/>
                   </a:solidFill>
                 </a:rPr>
-                <a:t>The Julia Programming Language. </a:t>
+                <a:t>The Julia Programming Language</a:t>
               </a:r>
               <a:r>
-                <a:rPr lang="en-US" sz="2000" i="1" dirty="0">
+                <a:rPr lang="en-US" sz="2000" dirty="0">
+                  <a:solidFill>
+                    <a:schemeClr val="tx1"/>
+                  </a:solidFill>
+                </a:rPr>
+                <a:t>. </a:t>
+              </a:r>
+              <a:r>
+                <a:rPr lang="en-US" sz="2000" dirty="0">
                   <a:solidFill>
                     <a:schemeClr val="tx1"/>
                   </a:solidFill>
@@ -7887,7 +7895,7 @@
                 </a:rPr>
                 <a:t>https://julialang.org/</a:t>
               </a:r>
-              <a:endParaRPr lang="en-US" sz="2000" i="1" dirty="0">
+              <a:endParaRPr lang="en-US" sz="2000" dirty="0">
                 <a:solidFill>
                   <a:schemeClr val="tx1"/>
                 </a:solidFill>
@@ -7920,18 +7928,10 @@
                     <a:schemeClr val="tx1"/>
                   </a:solidFill>
                 </a:rPr>
-                <a:t>.</a:t>
+                <a:t>.  </a:t>
               </a:r>
               <a:r>
-                <a:rPr lang="en-US" sz="2000" i="1" dirty="0">
-                  <a:solidFill>
-                    <a:schemeClr val="tx1"/>
-                  </a:solidFill>
-                </a:rPr>
-                <a:t>  </a:t>
-              </a:r>
-              <a:r>
-                <a:rPr lang="en-US" sz="2000" i="1" dirty="0">
+                <a:rPr lang="en-US" sz="2000" dirty="0">
                   <a:solidFill>
                     <a:schemeClr val="tx1"/>
                   </a:solidFill>
@@ -7939,7 +7939,7 @@
                 </a:rPr>
                 <a:t>https://arxiv.org/abs/2302.00740</a:t>
               </a:r>
-              <a:endParaRPr lang="en-US" sz="2000" i="1" dirty="0">
+              <a:endParaRPr lang="en-US" sz="2000" dirty="0">
                 <a:solidFill>
                   <a:schemeClr val="tx1"/>
                 </a:solidFill>

</xml_diff>

<commit_message>
Made more changes based on feedback
Changed some of the wording, and made the main diagram taller
</commit_message>
<xml_diff>
--- a/People/Brandon-Bosman/Julia Poster/Poster.pptx
+++ b/People/Brandon-Bosman/Julia Poster/Poster.pptx
@@ -5017,156 +5017,95 @@
             </a:bodyPr>
             <a:lstStyle/>
             <a:p>
-              <a:r>
-                <a:rPr lang="en-US" sz="2400" b="1" dirty="0">
-                  <a:solidFill>
-                    <a:schemeClr val="tx1"/>
-                  </a:solidFill>
-                </a:rPr>
-                <a:t>Goal: </a:t>
-              </a:r>
-              <a:r>
-                <a:rPr lang="en-US" sz="2000" dirty="0">
-                  <a:solidFill>
-                    <a:schemeClr val="tx1"/>
-                  </a:solidFill>
-                </a:rPr>
-                <a:t>minimize code duplication between GOOL and GProc.</a:t>
-              </a:r>
-            </a:p>
-            <a:p>
-              <a:pPr marL="342900" indent="-342900">
-                <a:buFont typeface="Arial" panose="020B0604020202020204" pitchFamily="34" charset="0"/>
-                <a:buChar char="•"/>
-              </a:pPr>
-              <a:r>
-                <a:rPr lang="en-US" sz="2000" dirty="0">
-                  <a:solidFill>
-                    <a:schemeClr val="tx1"/>
-                  </a:solidFill>
-                </a:rPr>
-                <a:t>Since most of GOOL and most of GProc hold the same features, both can inherit from a ‘shared’ generic language with typeclasses that both can use.</a:t>
-              </a:r>
-            </a:p>
-            <a:p>
-              <a:pPr marL="342900" indent="-342900">
-                <a:buFont typeface="Arial" panose="020B0604020202020204" pitchFamily="34" charset="0"/>
-                <a:buChar char="•"/>
-              </a:pPr>
-              <a:r>
-                <a:rPr lang="en-US" sz="2000" dirty="0">
-                  <a:solidFill>
-                    <a:schemeClr val="tx1"/>
-                  </a:solidFill>
-                </a:rPr>
-                <a:t>Problem: many of GOOL’s typeclasses are a mix of features that can be shared and features that are OO-Only.</a:t>
-              </a:r>
-              <a:br>
-                <a:rPr lang="en-US" sz="2000" dirty="0">
-                  <a:solidFill>
-                    <a:schemeClr val="tx1"/>
-                  </a:solidFill>
-                </a:rPr>
-              </a:br>
-              <a:r>
-                <a:rPr lang="en-US" sz="2000" dirty="0">
-                  <a:solidFill>
-                    <a:schemeClr val="tx1"/>
-                  </a:solidFill>
-                </a:rPr>
-                <a:t>For example, types:</a:t>
-              </a:r>
-            </a:p>
-            <a:p>
-              <a:endParaRPr lang="en-US" sz="2000" dirty="0">
+              <a:endParaRPr lang="en-US" sz="2400" b="1" dirty="0">
                 <a:solidFill>
                   <a:schemeClr val="tx1"/>
                 </a:solidFill>
               </a:endParaRPr>
             </a:p>
             <a:p>
-              <a:endParaRPr lang="en-US" sz="2000" dirty="0">
+              <a:endParaRPr lang="en-US" sz="2400" b="1" dirty="0">
                 <a:solidFill>
                   <a:schemeClr val="tx1"/>
                 </a:solidFill>
               </a:endParaRPr>
             </a:p>
             <a:p>
-              <a:endParaRPr lang="en-US" sz="2000" dirty="0">
+              <a:endParaRPr lang="en-US" sz="2400" b="1" dirty="0">
                 <a:solidFill>
                   <a:schemeClr val="tx1"/>
                 </a:solidFill>
               </a:endParaRPr>
             </a:p>
             <a:p>
-              <a:endParaRPr lang="en-US" sz="2000" dirty="0">
+              <a:endParaRPr lang="en-US" sz="2400" b="1" dirty="0">
                 <a:solidFill>
                   <a:schemeClr val="tx1"/>
                 </a:solidFill>
               </a:endParaRPr>
             </a:p>
             <a:p>
-              <a:endParaRPr lang="en-US" sz="2000" dirty="0">
+              <a:endParaRPr lang="en-US" sz="2400" b="1" dirty="0">
                 <a:solidFill>
                   <a:schemeClr val="tx1"/>
                 </a:solidFill>
               </a:endParaRPr>
             </a:p>
             <a:p>
-              <a:endParaRPr lang="en-US" sz="2000" dirty="0">
+              <a:endParaRPr lang="en-US" sz="2400" b="1" dirty="0">
                 <a:solidFill>
                   <a:schemeClr val="tx1"/>
                 </a:solidFill>
               </a:endParaRPr>
             </a:p>
             <a:p>
-              <a:endParaRPr lang="en-US" sz="2000" dirty="0">
+              <a:endParaRPr lang="en-US" sz="2400" b="1" dirty="0">
                 <a:solidFill>
                   <a:schemeClr val="tx1"/>
                 </a:solidFill>
               </a:endParaRPr>
             </a:p>
             <a:p>
-              <a:endParaRPr lang="en-US" sz="2000" dirty="0">
+              <a:endParaRPr lang="en-US" sz="2400" b="1" dirty="0">
                 <a:solidFill>
                   <a:schemeClr val="tx1"/>
                 </a:solidFill>
               </a:endParaRPr>
             </a:p>
             <a:p>
-              <a:endParaRPr lang="en-US" sz="2000" dirty="0">
+              <a:endParaRPr lang="en-US" sz="2400" b="1" dirty="0">
                 <a:solidFill>
                   <a:schemeClr val="tx1"/>
                 </a:solidFill>
               </a:endParaRPr>
             </a:p>
             <a:p>
-              <a:endParaRPr lang="en-US" sz="2000" dirty="0">
+              <a:endParaRPr lang="en-US" sz="2400" b="1" dirty="0">
                 <a:solidFill>
                   <a:schemeClr val="tx1"/>
                 </a:solidFill>
               </a:endParaRPr>
             </a:p>
             <a:p>
-              <a:endParaRPr lang="en-US" sz="2000" dirty="0">
+              <a:endParaRPr lang="en-US" sz="2400" b="1" dirty="0">
                 <a:solidFill>
                   <a:schemeClr val="tx1"/>
                 </a:solidFill>
               </a:endParaRPr>
             </a:p>
             <a:p>
-              <a:pPr marL="342900" indent="-342900">
-                <a:buFont typeface="Arial" panose="020B0604020202020204" pitchFamily="34" charset="0"/>
-                <a:buChar char="•"/>
-              </a:pPr>
-              <a:r>
-                <a:rPr lang="en-US" sz="2000" dirty="0">
-                  <a:solidFill>
-                    <a:schemeClr val="tx1"/>
-                  </a:solidFill>
-                </a:rPr>
-                <a:t>Solution: split up Mixed typeclasses into Shared and OO-Only components.</a:t>
-              </a:r>
+              <a:endParaRPr lang="en-US" sz="2400" b="1" dirty="0">
+                <a:solidFill>
+                  <a:schemeClr val="tx1"/>
+                </a:solidFill>
+              </a:endParaRPr>
+            </a:p>
+            <a:p>
+              <a:endParaRPr lang="en-US" sz="2400" b="1" dirty="0">
+                <a:solidFill>
+                  <a:schemeClr val="tx1"/>
+                </a:solidFill>
+              </a:endParaRPr>
             </a:p>
             <a:p>
               <a:r>
@@ -5177,6 +5116,13 @@
                 </a:rPr>
                 <a:t>Result:</a:t>
               </a:r>
+            </a:p>
+            <a:p>
+              <a:endParaRPr lang="en-US" sz="2000" dirty="0">
+                <a:solidFill>
+                  <a:schemeClr val="tx1"/>
+                </a:solidFill>
+              </a:endParaRPr>
             </a:p>
             <a:p>
               <a:endParaRPr lang="en-US" sz="2000" dirty="0">
@@ -5527,7 +5473,7 @@
                     <a:schemeClr val="tx1"/>
                   </a:solidFill>
                 </a:rPr>
-                <a:t>Julia is not OO, so not everything we can express in GOOL can be expressed in Julia.</a:t>
+                <a:t>Because of this, not everything we can express in GOOL can be expressed in Julia.</a:t>
               </a:r>
             </a:p>
             <a:p>
@@ -5596,7 +5542,7 @@
                     <a:schemeClr val="tx1"/>
                   </a:solidFill>
                 </a:rPr>
-                <a:t>Since GOOL is too flexible, we need a new set of typeclasses to express what can be expressed in procedural languages.  We created GProc, the GOOL of procedural programs.</a:t>
+                <a:t>Since GOOL is too OO-specific, we need a new set of typeclasses to express what can be expressed in procedural languages.  We created GProc, the GOOL of procedural programs.</a:t>
               </a:r>
             </a:p>
           </p:txBody>
@@ -8118,8 +8064,8 @@
         </p:nvSpPr>
         <p:spPr>
           <a:xfrm>
-            <a:off x="9476508" y="12251803"/>
-            <a:ext cx="13948755" cy="7594900"/>
+            <a:off x="9460480" y="11778605"/>
+            <a:ext cx="13948755" cy="7924538"/>
           </a:xfrm>
           <a:prstGeom prst="rect">
             <a:avLst/>
@@ -8184,7 +8130,7 @@
         </p:nvGrpSpPr>
         <p:grpSpPr>
           <a:xfrm>
-            <a:off x="9909111" y="16999463"/>
+            <a:off x="9893083" y="16907264"/>
             <a:ext cx="3700551" cy="1905000"/>
             <a:chOff x="9674679" y="15773400"/>
             <a:chExt cx="3700551" cy="1905000"/>
@@ -8563,7 +8509,7 @@
         </p:nvSpPr>
         <p:spPr>
           <a:xfrm>
-            <a:off x="9624744" y="12399008"/>
+            <a:off x="9608716" y="11925810"/>
             <a:ext cx="6545729" cy="815608"/>
           </a:xfrm>
           <a:prstGeom prst="rect">
@@ -8600,7 +8546,7 @@
         </p:nvSpPr>
         <p:spPr>
           <a:xfrm>
-            <a:off x="16170639" y="12392867"/>
+            <a:off x="16154611" y="11919669"/>
             <a:ext cx="7095761" cy="815608"/>
           </a:xfrm>
           <a:prstGeom prst="rect">
@@ -8623,100 +8569,6 @@
           </a:p>
         </p:txBody>
       </p:sp>
-      <p:pic>
-        <p:nvPicPr>
-          <p:cNvPr id="59" name="Picture 18">
-            <a:extLst>
-              <a:ext uri="{FF2B5EF4-FFF2-40B4-BE49-F238E27FC236}">
-                <a16:creationId xmlns:a16="http://schemas.microsoft.com/office/drawing/2014/main" id="{45353EDB-E1AE-B5A9-5CC0-A901F77587D5}"/>
-              </a:ext>
-            </a:extLst>
-          </p:cNvPr>
-          <p:cNvPicPr>
-            <a:picLocks noChangeAspect="1" noChangeArrowheads="1"/>
-          </p:cNvPicPr>
-          <p:nvPr/>
-        </p:nvPicPr>
-        <p:blipFill>
-          <a:blip r:embed="rId24">
-            <a:extLst>
-              <a:ext uri="{28A0092B-C50C-407E-A947-70E740481C1C}">
-                <a14:useLocalDpi xmlns:a14="http://schemas.microsoft.com/office/drawing/2010/main" val="0"/>
-              </a:ext>
-            </a:extLst>
-          </a:blip>
-          <a:srcRect/>
-          <a:stretch>
-            <a:fillRect/>
-          </a:stretch>
-        </p:blipFill>
-        <p:spPr bwMode="auto">
-          <a:xfrm>
-            <a:off x="9880998" y="13101226"/>
-            <a:ext cx="5927749" cy="3965770"/>
-          </a:xfrm>
-          <a:prstGeom prst="rect">
-            <a:avLst/>
-          </a:prstGeom>
-          <a:noFill/>
-          <a:extLst>
-            <a:ext uri="{909E8E84-426E-40DD-AFC4-6F175D3DCCD1}">
-              <a14:hiddenFill xmlns:a14="http://schemas.microsoft.com/office/drawing/2010/main">
-                <a:solidFill>
-                  <a:srgbClr val="FFFFFF"/>
-                </a:solidFill>
-              </a14:hiddenFill>
-            </a:ext>
-          </a:extLst>
-        </p:spPr>
-      </p:pic>
-      <p:pic>
-        <p:nvPicPr>
-          <p:cNvPr id="65" name="Picture 22">
-            <a:extLst>
-              <a:ext uri="{FF2B5EF4-FFF2-40B4-BE49-F238E27FC236}">
-                <a16:creationId xmlns:a16="http://schemas.microsoft.com/office/drawing/2014/main" id="{10C38AA5-9B4F-F61D-94E9-03B9BEC8ED8D}"/>
-              </a:ext>
-            </a:extLst>
-          </p:cNvPr>
-          <p:cNvPicPr>
-            <a:picLocks noChangeAspect="1" noChangeArrowheads="1"/>
-          </p:cNvPicPr>
-          <p:nvPr/>
-        </p:nvPicPr>
-        <p:blipFill>
-          <a:blip r:embed="rId25">
-            <a:extLst>
-              <a:ext uri="{28A0092B-C50C-407E-A947-70E740481C1C}">
-                <a14:useLocalDpi xmlns:a14="http://schemas.microsoft.com/office/drawing/2010/main" val="0"/>
-              </a:ext>
-            </a:extLst>
-          </a:blip>
-          <a:srcRect/>
-          <a:stretch>
-            <a:fillRect/>
-          </a:stretch>
-        </p:blipFill>
-        <p:spPr bwMode="auto">
-          <a:xfrm>
-            <a:off x="16083358" y="13101226"/>
-            <a:ext cx="7067293" cy="5262395"/>
-          </a:xfrm>
-          <a:prstGeom prst="rect">
-            <a:avLst/>
-          </a:prstGeom>
-          <a:noFill/>
-          <a:extLst>
-            <a:ext uri="{909E8E84-426E-40DD-AFC4-6F175D3DCCD1}">
-              <a14:hiddenFill xmlns:a14="http://schemas.microsoft.com/office/drawing/2010/main">
-                <a:solidFill>
-                  <a:srgbClr val="FFFFFF"/>
-                </a:solidFill>
-              </a14:hiddenFill>
-            </a:ext>
-          </a:extLst>
-        </p:spPr>
-      </p:pic>
       <p:grpSp>
         <p:nvGrpSpPr>
           <p:cNvPr id="38" name="Group 37">
@@ -8731,10 +8583,10 @@
         </p:nvGrpSpPr>
         <p:grpSpPr>
           <a:xfrm>
-            <a:off x="12904861" y="7934983"/>
-            <a:ext cx="7108678" cy="3406891"/>
-            <a:chOff x="12224351" y="7934983"/>
-            <a:chExt cx="7108678" cy="3406891"/>
+            <a:off x="15996751" y="6582743"/>
+            <a:ext cx="7428511" cy="4027363"/>
+            <a:chOff x="11904517" y="7934983"/>
+            <a:chExt cx="7428511" cy="4027363"/>
           </a:xfrm>
         </p:grpSpPr>
         <p:sp>
@@ -8751,8 +8603,8 @@
           </p:nvSpPr>
           <p:spPr>
             <a:xfrm>
-              <a:off x="12224351" y="7934983"/>
-              <a:ext cx="7108677" cy="3406891"/>
+              <a:off x="11904517" y="7934983"/>
+              <a:ext cx="7428511" cy="4027363"/>
             </a:xfrm>
             <a:prstGeom prst="rect">
               <a:avLst/>
@@ -8817,10 +8669,10 @@
           </p:nvGrpSpPr>
           <p:grpSpPr>
             <a:xfrm>
-              <a:off x="15916452" y="8529376"/>
-              <a:ext cx="3416577" cy="1905000"/>
-              <a:chOff x="9674678" y="15773400"/>
-              <a:chExt cx="3416577" cy="1905000"/>
+              <a:off x="15916451" y="9052889"/>
+              <a:ext cx="3416577" cy="1202093"/>
+              <a:chOff x="9674677" y="16296913"/>
+              <a:chExt cx="3416577" cy="1202093"/>
             </a:xfrm>
           </p:grpSpPr>
           <p:sp>
@@ -8837,8 +8689,8 @@
             </p:nvSpPr>
             <p:spPr>
               <a:xfrm>
-                <a:off x="9674678" y="15773400"/>
-                <a:ext cx="3416577" cy="1905000"/>
+                <a:off x="9674677" y="16296913"/>
+                <a:ext cx="3416577" cy="1202093"/>
               </a:xfrm>
               <a:prstGeom prst="rect">
                 <a:avLst/>
@@ -8941,7 +8793,7 @@
             </p:nvSpPr>
             <p:spPr>
               <a:xfrm>
-                <a:off x="9823968" y="16163874"/>
+                <a:off x="9823967" y="16687387"/>
                 <a:ext cx="118872" cy="118872"/>
               </a:xfrm>
               <a:prstGeom prst="rect">
@@ -8995,7 +8847,7 @@
             </p:nvSpPr>
             <p:spPr>
               <a:xfrm>
-                <a:off x="9823968" y="16384013"/>
+                <a:off x="9823967" y="16907526"/>
                 <a:ext cx="118872" cy="118872"/>
               </a:xfrm>
               <a:prstGeom prst="rect">
@@ -9049,7 +8901,7 @@
             </p:nvSpPr>
             <p:spPr>
               <a:xfrm>
-                <a:off x="9823968" y="16594325"/>
+                <a:off x="9823967" y="17117838"/>
                 <a:ext cx="118872" cy="118872"/>
               </a:xfrm>
               <a:prstGeom prst="rect">
@@ -9105,7 +8957,7 @@
             <p:nvPr/>
           </p:nvPicPr>
           <p:blipFill>
-            <a:blip r:embed="rId26">
+            <a:blip r:embed="rId24">
               <a:extLst>
                 <a:ext uri="{28A0092B-C50C-407E-A947-70E740481C1C}">
                   <a14:useLocalDpi xmlns:a14="http://schemas.microsoft.com/office/drawing/2010/main" val="0"/>
@@ -9119,8 +8971,8 @@
           </p:blipFill>
           <p:spPr bwMode="auto">
             <a:xfrm>
-              <a:off x="12338747" y="8109574"/>
-              <a:ext cx="3552825" cy="2600325"/>
+              <a:off x="12094164" y="8287927"/>
+              <a:ext cx="3896933" cy="2852179"/>
             </a:xfrm>
             <a:prstGeom prst="rect">
               <a:avLst/>
@@ -9138,6 +8990,323 @@
           </p:spPr>
         </p:pic>
       </p:grpSp>
+      <p:sp>
+        <p:nvSpPr>
+          <p:cNvPr id="4" name="TextBox 3">
+            <a:extLst>
+              <a:ext uri="{FF2B5EF4-FFF2-40B4-BE49-F238E27FC236}">
+                <a16:creationId xmlns:a16="http://schemas.microsoft.com/office/drawing/2014/main" id="{B8A4239C-773C-EB80-8BA5-4CC56A79A7AE}"/>
+              </a:ext>
+            </a:extLst>
+          </p:cNvPr>
+          <p:cNvSpPr txBox="1"/>
+          <p:nvPr/>
+        </p:nvSpPr>
+        <p:spPr>
+          <a:xfrm>
+            <a:off x="9236402" y="6262915"/>
+            <a:ext cx="6760349" cy="3770263"/>
+          </a:xfrm>
+          <a:prstGeom prst="rect">
+            <a:avLst/>
+          </a:prstGeom>
+          <a:noFill/>
+        </p:spPr>
+        <p:txBody>
+          <a:bodyPr wrap="square" lIns="274320" tIns="274320" rtlCol="0">
+            <a:spAutoFit/>
+          </a:bodyPr>
+          <a:lstStyle/>
+          <a:p>
+            <a:pPr marL="0" marR="0" lvl="0" indent="0" algn="l" defTabSz="326532" rtl="0" eaLnBrk="1" fontAlgn="auto" latinLnBrk="0" hangingPunct="1">
+              <a:lnSpc>
+                <a:spcPct val="100000"/>
+              </a:lnSpc>
+              <a:spcBef>
+                <a:spcPts val="0"/>
+              </a:spcBef>
+              <a:spcAft>
+                <a:spcPts val="0"/>
+              </a:spcAft>
+              <a:buClrTx/>
+              <a:buSzTx/>
+              <a:buFontTx/>
+              <a:buNone/>
+              <a:tabLst/>
+              <a:defRPr/>
+            </a:pPr>
+            <a:r>
+              <a:rPr kumimoji="0" lang="en-US" sz="2400" b="1" i="0" u="none" strike="noStrike" kern="1200" cap="none" spc="0" normalizeH="0" baseline="0" noProof="0" dirty="0">
+                <a:ln>
+                  <a:noFill/>
+                </a:ln>
+                <a:solidFill>
+                  <a:prstClr val="black"/>
+                </a:solidFill>
+                <a:effectLst/>
+                <a:uLnTx/>
+                <a:uFillTx/>
+                <a:latin typeface="Aptos" panose="02110004020202020204"/>
+                <a:ea typeface="+mn-ea"/>
+                <a:cs typeface="+mn-cs"/>
+              </a:rPr>
+              <a:t>Goal: </a:t>
+            </a:r>
+            <a:r>
+              <a:rPr kumimoji="0" lang="en-US" sz="2000" b="0" i="0" u="none" strike="noStrike" kern="1200" cap="none" spc="0" normalizeH="0" baseline="0" noProof="0" dirty="0">
+                <a:ln>
+                  <a:noFill/>
+                </a:ln>
+                <a:solidFill>
+                  <a:prstClr val="black"/>
+                </a:solidFill>
+                <a:effectLst/>
+                <a:uLnTx/>
+                <a:uFillTx/>
+                <a:latin typeface="Aptos" panose="02110004020202020204"/>
+                <a:ea typeface="+mn-ea"/>
+                <a:cs typeface="+mn-cs"/>
+              </a:rPr>
+              <a:t>minimize code duplication between GOOL and GProc.</a:t>
+            </a:r>
+          </a:p>
+          <a:p>
+            <a:pPr marL="342900" marR="0" lvl="0" indent="-342900" algn="l" defTabSz="326532" rtl="0" eaLnBrk="1" fontAlgn="auto" latinLnBrk="0" hangingPunct="1">
+              <a:lnSpc>
+                <a:spcPct val="100000"/>
+              </a:lnSpc>
+              <a:spcBef>
+                <a:spcPts val="0"/>
+              </a:spcBef>
+              <a:spcAft>
+                <a:spcPts val="0"/>
+              </a:spcAft>
+              <a:buClrTx/>
+              <a:buSzTx/>
+              <a:buFont typeface="Arial" panose="020B0604020202020204" pitchFamily="34" charset="0"/>
+              <a:buChar char="•"/>
+              <a:tabLst/>
+              <a:defRPr/>
+            </a:pPr>
+            <a:r>
+              <a:rPr kumimoji="0" lang="en-US" sz="2000" b="0" i="0" u="none" strike="noStrike" kern="1200" cap="none" spc="0" normalizeH="0" baseline="0" noProof="0" dirty="0">
+                <a:ln>
+                  <a:noFill/>
+                </a:ln>
+                <a:solidFill>
+                  <a:prstClr val="black"/>
+                </a:solidFill>
+                <a:effectLst/>
+                <a:uLnTx/>
+                <a:uFillTx/>
+                <a:latin typeface="Aptos" panose="02110004020202020204"/>
+                <a:ea typeface="+mn-ea"/>
+                <a:cs typeface="+mn-cs"/>
+              </a:rPr>
+              <a:t>Since most of GOOL and most of GProc hold the same features, both can inherit from a ‘shared’ generic language with typeclasses that both can use.</a:t>
+            </a:r>
+          </a:p>
+          <a:p>
+            <a:pPr marL="342900" marR="0" lvl="0" indent="-342900" algn="l" defTabSz="326532" rtl="0" eaLnBrk="1" fontAlgn="auto" latinLnBrk="0" hangingPunct="1">
+              <a:lnSpc>
+                <a:spcPct val="100000"/>
+              </a:lnSpc>
+              <a:spcBef>
+                <a:spcPts val="0"/>
+              </a:spcBef>
+              <a:spcAft>
+                <a:spcPts val="0"/>
+              </a:spcAft>
+              <a:buClrTx/>
+              <a:buSzTx/>
+              <a:buFont typeface="Arial" panose="020B0604020202020204" pitchFamily="34" charset="0"/>
+              <a:buChar char="•"/>
+              <a:tabLst/>
+              <a:defRPr/>
+            </a:pPr>
+            <a:r>
+              <a:rPr kumimoji="0" lang="en-US" sz="2000" b="0" i="0" u="none" strike="noStrike" kern="1200" cap="none" spc="0" normalizeH="0" baseline="0" noProof="0" dirty="0">
+                <a:ln>
+                  <a:noFill/>
+                </a:ln>
+                <a:solidFill>
+                  <a:prstClr val="black"/>
+                </a:solidFill>
+                <a:effectLst/>
+                <a:uLnTx/>
+                <a:uFillTx/>
+                <a:latin typeface="Aptos" panose="02110004020202020204"/>
+                <a:ea typeface="+mn-ea"/>
+                <a:cs typeface="+mn-cs"/>
+              </a:rPr>
+              <a:t>Problem: many of GOOL’s typeclasses are a mix of features that can be shared and features that are OO-Only.</a:t>
+            </a:r>
+            <a:br>
+              <a:rPr kumimoji="0" lang="en-US" sz="2000" b="0" i="0" u="none" strike="noStrike" kern="1200" cap="none" spc="0" normalizeH="0" baseline="0" noProof="0" dirty="0">
+                <a:ln>
+                  <a:noFill/>
+                </a:ln>
+                <a:solidFill>
+                  <a:prstClr val="black"/>
+                </a:solidFill>
+                <a:effectLst/>
+                <a:uLnTx/>
+                <a:uFillTx/>
+                <a:latin typeface="Aptos" panose="02110004020202020204"/>
+                <a:ea typeface="+mn-ea"/>
+                <a:cs typeface="+mn-cs"/>
+              </a:rPr>
+            </a:br>
+            <a:r>
+              <a:rPr kumimoji="0" lang="en-US" sz="2000" b="0" i="0" u="none" strike="noStrike" kern="1200" cap="none" spc="0" normalizeH="0" baseline="0" noProof="0" dirty="0">
+                <a:ln>
+                  <a:noFill/>
+                </a:ln>
+                <a:solidFill>
+                  <a:prstClr val="black"/>
+                </a:solidFill>
+                <a:effectLst/>
+                <a:uLnTx/>
+                <a:uFillTx/>
+                <a:latin typeface="Aptos" panose="02110004020202020204"/>
+                <a:ea typeface="+mn-ea"/>
+                <a:cs typeface="+mn-cs"/>
+              </a:rPr>
+              <a:t>For example, types:</a:t>
+            </a:r>
+          </a:p>
+          <a:p>
+            <a:pPr marL="342900" marR="0" lvl="0" indent="-342900" algn="l" defTabSz="326532" rtl="0" eaLnBrk="1" fontAlgn="auto" latinLnBrk="0" hangingPunct="1">
+              <a:lnSpc>
+                <a:spcPct val="100000"/>
+              </a:lnSpc>
+              <a:spcBef>
+                <a:spcPts val="0"/>
+              </a:spcBef>
+              <a:spcAft>
+                <a:spcPts val="0"/>
+              </a:spcAft>
+              <a:buClrTx/>
+              <a:buSzTx/>
+              <a:buFont typeface="Arial" panose="020B0604020202020204" pitchFamily="34" charset="0"/>
+              <a:buChar char="•"/>
+              <a:tabLst/>
+              <a:defRPr/>
+            </a:pPr>
+            <a:r>
+              <a:rPr kumimoji="0" lang="en-US" sz="2000" b="0" i="0" u="none" strike="noStrike" kern="1200" cap="none" spc="0" normalizeH="0" baseline="0" noProof="0" dirty="0">
+                <a:ln>
+                  <a:noFill/>
+                </a:ln>
+                <a:solidFill>
+                  <a:prstClr val="black"/>
+                </a:solidFill>
+                <a:effectLst/>
+                <a:uLnTx/>
+                <a:uFillTx/>
+                <a:latin typeface="Aptos" panose="02110004020202020204"/>
+                <a:ea typeface="+mn-ea"/>
+                <a:cs typeface="+mn-cs"/>
+              </a:rPr>
+              <a:t>Solution: split up Mixed typeclasses into Shared and OO-Only components.</a:t>
+            </a:r>
+          </a:p>
+        </p:txBody>
+      </p:sp>
+      <p:pic>
+        <p:nvPicPr>
+          <p:cNvPr id="34" name="Picture 33">
+            <a:extLst>
+              <a:ext uri="{FF2B5EF4-FFF2-40B4-BE49-F238E27FC236}">
+                <a16:creationId xmlns:a16="http://schemas.microsoft.com/office/drawing/2014/main" id="{453F4224-9228-9B27-6DAD-3E3700617538}"/>
+              </a:ext>
+            </a:extLst>
+          </p:cNvPr>
+          <p:cNvPicPr>
+            <a:picLocks noChangeAspect="1" noChangeArrowheads="1"/>
+          </p:cNvPicPr>
+          <p:nvPr/>
+        </p:nvPicPr>
+        <p:blipFill>
+          <a:blip r:embed="rId25">
+            <a:extLst>
+              <a:ext uri="{28A0092B-C50C-407E-A947-70E740481C1C}">
+                <a14:useLocalDpi xmlns:a14="http://schemas.microsoft.com/office/drawing/2010/main" val="0"/>
+              </a:ext>
+            </a:extLst>
+          </a:blip>
+          <a:srcRect/>
+          <a:stretch>
+            <a:fillRect/>
+          </a:stretch>
+        </p:blipFill>
+        <p:spPr bwMode="auto">
+          <a:xfrm>
+            <a:off x="9868636" y="12684584"/>
+            <a:ext cx="5925312" cy="4642512"/>
+          </a:xfrm>
+          <a:prstGeom prst="rect">
+            <a:avLst/>
+          </a:prstGeom>
+          <a:noFill/>
+          <a:extLst>
+            <a:ext uri="{909E8E84-426E-40DD-AFC4-6F175D3DCCD1}">
+              <a14:hiddenFill xmlns:a14="http://schemas.microsoft.com/office/drawing/2010/main">
+                <a:solidFill>
+                  <a:srgbClr val="FFFFFF"/>
+                </a:solidFill>
+              </a14:hiddenFill>
+            </a:ext>
+          </a:extLst>
+        </p:spPr>
+      </p:pic>
+      <p:pic>
+        <p:nvPicPr>
+          <p:cNvPr id="39" name="Picture 6">
+            <a:extLst>
+              <a:ext uri="{FF2B5EF4-FFF2-40B4-BE49-F238E27FC236}">
+                <a16:creationId xmlns:a16="http://schemas.microsoft.com/office/drawing/2014/main" id="{151035B9-46BE-D3FB-CD18-8ABC23CC6EB7}"/>
+              </a:ext>
+            </a:extLst>
+          </p:cNvPr>
+          <p:cNvPicPr>
+            <a:picLocks noChangeAspect="1" noChangeArrowheads="1"/>
+          </p:cNvPicPr>
+          <p:nvPr/>
+        </p:nvPicPr>
+        <p:blipFill>
+          <a:blip r:embed="rId26">
+            <a:extLst>
+              <a:ext uri="{28A0092B-C50C-407E-A947-70E740481C1C}">
+                <a14:useLocalDpi xmlns:a14="http://schemas.microsoft.com/office/drawing/2010/main" val="0"/>
+              </a:ext>
+            </a:extLst>
+          </a:blip>
+          <a:srcRect/>
+          <a:stretch>
+            <a:fillRect/>
+          </a:stretch>
+        </p:blipFill>
+        <p:spPr bwMode="auto">
+          <a:xfrm>
+            <a:off x="16068268" y="12684584"/>
+            <a:ext cx="7068312" cy="6050682"/>
+          </a:xfrm>
+          <a:prstGeom prst="rect">
+            <a:avLst/>
+          </a:prstGeom>
+          <a:noFill/>
+          <a:extLst>
+            <a:ext uri="{909E8E84-426E-40DD-AFC4-6F175D3DCCD1}">
+              <a14:hiddenFill xmlns:a14="http://schemas.microsoft.com/office/drawing/2010/main">
+                <a:solidFill>
+                  <a:srgbClr val="FFFFFF"/>
+                </a:solidFill>
+              </a14:hiddenFill>
+            </a:ext>
+          </a:extLst>
+        </p:spPr>
+      </p:pic>
     </p:spTree>
     <p:extLst>
       <p:ext uri="{BB962C8B-B14F-4D97-AF65-F5344CB8AC3E}">

</xml_diff>

<commit_message>
Fixed typo in Julia poster
'Department of Computer and Software' => 'Department of Computing and
Software'

I don't think anyone noticed 😅
</commit_message>
<xml_diff>
--- a/People/Brandon-Bosman/Julia Poster/Poster.pptx
+++ b/People/Brandon-Bosman/Julia Poster/Poster.pptx
@@ -1954,7 +1954,7 @@
           <a:p>
             <a:fld id="{861E132A-DEB2-4D7F-AB88-2444701CC7A8}" type="datetimeFigureOut">
               <a:rPr lang="en-CA" smtClean="0"/>
-              <a:t>2024-08-13</a:t>
+              <a:t>2024-08-26</a:t>
             </a:fld>
             <a:endParaRPr lang="en-CA"/>
           </a:p>
@@ -2124,7 +2124,7 @@
           <a:p>
             <a:fld id="{861E132A-DEB2-4D7F-AB88-2444701CC7A8}" type="datetimeFigureOut">
               <a:rPr lang="en-CA" smtClean="0"/>
-              <a:t>2024-08-13</a:t>
+              <a:t>2024-08-26</a:t>
             </a:fld>
             <a:endParaRPr lang="en-CA"/>
           </a:p>
@@ -2304,7 +2304,7 @@
           <a:p>
             <a:fld id="{861E132A-DEB2-4D7F-AB88-2444701CC7A8}" type="datetimeFigureOut">
               <a:rPr lang="en-CA" smtClean="0"/>
-              <a:t>2024-08-13</a:t>
+              <a:t>2024-08-26</a:t>
             </a:fld>
             <a:endParaRPr lang="en-CA"/>
           </a:p>
@@ -2474,7 +2474,7 @@
           <a:p>
             <a:fld id="{861E132A-DEB2-4D7F-AB88-2444701CC7A8}" type="datetimeFigureOut">
               <a:rPr lang="en-CA" smtClean="0"/>
-              <a:t>2024-08-13</a:t>
+              <a:t>2024-08-26</a:t>
             </a:fld>
             <a:endParaRPr lang="en-CA"/>
           </a:p>
@@ -2720,7 +2720,7 @@
           <a:p>
             <a:fld id="{861E132A-DEB2-4D7F-AB88-2444701CC7A8}" type="datetimeFigureOut">
               <a:rPr lang="en-CA" smtClean="0"/>
-              <a:t>2024-08-13</a:t>
+              <a:t>2024-08-26</a:t>
             </a:fld>
             <a:endParaRPr lang="en-CA"/>
           </a:p>
@@ -2952,7 +2952,7 @@
           <a:p>
             <a:fld id="{861E132A-DEB2-4D7F-AB88-2444701CC7A8}" type="datetimeFigureOut">
               <a:rPr lang="en-CA" smtClean="0"/>
-              <a:t>2024-08-13</a:t>
+              <a:t>2024-08-26</a:t>
             </a:fld>
             <a:endParaRPr lang="en-CA"/>
           </a:p>
@@ -3319,7 +3319,7 @@
           <a:p>
             <a:fld id="{861E132A-DEB2-4D7F-AB88-2444701CC7A8}" type="datetimeFigureOut">
               <a:rPr lang="en-CA" smtClean="0"/>
-              <a:t>2024-08-13</a:t>
+              <a:t>2024-08-26</a:t>
             </a:fld>
             <a:endParaRPr lang="en-CA"/>
           </a:p>
@@ -3437,7 +3437,7 @@
           <a:p>
             <a:fld id="{861E132A-DEB2-4D7F-AB88-2444701CC7A8}" type="datetimeFigureOut">
               <a:rPr lang="en-CA" smtClean="0"/>
-              <a:t>2024-08-13</a:t>
+              <a:t>2024-08-26</a:t>
             </a:fld>
             <a:endParaRPr lang="en-CA"/>
           </a:p>
@@ -3532,7 +3532,7 @@
           <a:p>
             <a:fld id="{861E132A-DEB2-4D7F-AB88-2444701CC7A8}" type="datetimeFigureOut">
               <a:rPr lang="en-CA" smtClean="0"/>
-              <a:t>2024-08-13</a:t>
+              <a:t>2024-08-26</a:t>
             </a:fld>
             <a:endParaRPr lang="en-CA"/>
           </a:p>
@@ -3809,7 +3809,7 @@
           <a:p>
             <a:fld id="{861E132A-DEB2-4D7F-AB88-2444701CC7A8}" type="datetimeFigureOut">
               <a:rPr lang="en-CA" smtClean="0"/>
-              <a:t>2024-08-13</a:t>
+              <a:t>2024-08-26</a:t>
             </a:fld>
             <a:endParaRPr lang="en-CA"/>
           </a:p>
@@ -4066,7 +4066,7 @@
           <a:p>
             <a:fld id="{861E132A-DEB2-4D7F-AB88-2444701CC7A8}" type="datetimeFigureOut">
               <a:rPr lang="en-CA" smtClean="0"/>
-              <a:t>2024-08-13</a:t>
+              <a:t>2024-08-26</a:t>
             </a:fld>
             <a:endParaRPr lang="en-CA"/>
           </a:p>
@@ -4279,7 +4279,7 @@
           <a:p>
             <a:fld id="{861E132A-DEB2-4D7F-AB88-2444701CC7A8}" type="datetimeFigureOut">
               <a:rPr lang="en-CA" smtClean="0"/>
-              <a:t>2024-08-13</a:t>
+              <a:t>2024-08-26</a:t>
             </a:fld>
             <a:endParaRPr lang="en-CA"/>
           </a:p>
@@ -6120,7 +6120,7 @@
                 <a:ea typeface="+mn-ea"/>
                 <a:cs typeface="+mn-cs"/>
               </a:rPr>
-              <a:t>Department of Computer and Software, McMaster University</a:t>
+              <a:t>Department of Computing and Software, McMaster University</a:t>
             </a:r>
             <a:endParaRPr kumimoji="0" lang="en-CA" sz="2400" b="0" i="0" u="none" strike="noStrike" kern="1200" cap="none" spc="0" normalizeH="0" baseline="0" noProof="0" dirty="0">
               <a:ln>

</xml_diff>